<commit_message>
updated to show changes in program
</commit_message>
<xml_diff>
--- a/class diagram2.pptx
+++ b/class diagram2.pptx
@@ -243,7 +243,7 @@
           <a:p>
             <a:fld id="{D0F472A9-B681-4220-8C78-E10435545E66}" type="datetimeFigureOut">
               <a:rPr lang="en-GB" smtClean="0"/>
-              <a:t>31/03/2021</a:t>
+              <a:t>02/04/2021</a:t>
             </a:fld>
             <a:endParaRPr lang="en-GB"/>
           </a:p>
@@ -413,7 +413,7 @@
           <a:p>
             <a:fld id="{D0F472A9-B681-4220-8C78-E10435545E66}" type="datetimeFigureOut">
               <a:rPr lang="en-GB" smtClean="0"/>
-              <a:t>31/03/2021</a:t>
+              <a:t>02/04/2021</a:t>
             </a:fld>
             <a:endParaRPr lang="en-GB"/>
           </a:p>
@@ -593,7 +593,7 @@
           <a:p>
             <a:fld id="{D0F472A9-B681-4220-8C78-E10435545E66}" type="datetimeFigureOut">
               <a:rPr lang="en-GB" smtClean="0"/>
-              <a:t>31/03/2021</a:t>
+              <a:t>02/04/2021</a:t>
             </a:fld>
             <a:endParaRPr lang="en-GB"/>
           </a:p>
@@ -763,7 +763,7 @@
           <a:p>
             <a:fld id="{D0F472A9-B681-4220-8C78-E10435545E66}" type="datetimeFigureOut">
               <a:rPr lang="en-GB" smtClean="0"/>
-              <a:t>31/03/2021</a:t>
+              <a:t>02/04/2021</a:t>
             </a:fld>
             <a:endParaRPr lang="en-GB"/>
           </a:p>
@@ -1007,7 +1007,7 @@
           <a:p>
             <a:fld id="{D0F472A9-B681-4220-8C78-E10435545E66}" type="datetimeFigureOut">
               <a:rPr lang="en-GB" smtClean="0"/>
-              <a:t>31/03/2021</a:t>
+              <a:t>02/04/2021</a:t>
             </a:fld>
             <a:endParaRPr lang="en-GB"/>
           </a:p>
@@ -1239,7 +1239,7 @@
           <a:p>
             <a:fld id="{D0F472A9-B681-4220-8C78-E10435545E66}" type="datetimeFigureOut">
               <a:rPr lang="en-GB" smtClean="0"/>
-              <a:t>31/03/2021</a:t>
+              <a:t>02/04/2021</a:t>
             </a:fld>
             <a:endParaRPr lang="en-GB"/>
           </a:p>
@@ -1606,7 +1606,7 @@
           <a:p>
             <a:fld id="{D0F472A9-B681-4220-8C78-E10435545E66}" type="datetimeFigureOut">
               <a:rPr lang="en-GB" smtClean="0"/>
-              <a:t>31/03/2021</a:t>
+              <a:t>02/04/2021</a:t>
             </a:fld>
             <a:endParaRPr lang="en-GB"/>
           </a:p>
@@ -1724,7 +1724,7 @@
           <a:p>
             <a:fld id="{D0F472A9-B681-4220-8C78-E10435545E66}" type="datetimeFigureOut">
               <a:rPr lang="en-GB" smtClean="0"/>
-              <a:t>31/03/2021</a:t>
+              <a:t>02/04/2021</a:t>
             </a:fld>
             <a:endParaRPr lang="en-GB"/>
           </a:p>
@@ -1819,7 +1819,7 @@
           <a:p>
             <a:fld id="{D0F472A9-B681-4220-8C78-E10435545E66}" type="datetimeFigureOut">
               <a:rPr lang="en-GB" smtClean="0"/>
-              <a:t>31/03/2021</a:t>
+              <a:t>02/04/2021</a:t>
             </a:fld>
             <a:endParaRPr lang="en-GB"/>
           </a:p>
@@ -2096,7 +2096,7 @@
           <a:p>
             <a:fld id="{D0F472A9-B681-4220-8C78-E10435545E66}" type="datetimeFigureOut">
               <a:rPr lang="en-GB" smtClean="0"/>
-              <a:t>31/03/2021</a:t>
+              <a:t>02/04/2021</a:t>
             </a:fld>
             <a:endParaRPr lang="en-GB"/>
           </a:p>
@@ -2353,7 +2353,7 @@
           <a:p>
             <a:fld id="{D0F472A9-B681-4220-8C78-E10435545E66}" type="datetimeFigureOut">
               <a:rPr lang="en-GB" smtClean="0"/>
-              <a:t>31/03/2021</a:t>
+              <a:t>02/04/2021</a:t>
             </a:fld>
             <a:endParaRPr lang="en-GB"/>
           </a:p>
@@ -2566,7 +2566,7 @@
           <a:p>
             <a:fld id="{D0F472A9-B681-4220-8C78-E10435545E66}" type="datetimeFigureOut">
               <a:rPr lang="en-GB" smtClean="0"/>
-              <a:t>31/03/2021</a:t>
+              <a:t>02/04/2021</a:t>
             </a:fld>
             <a:endParaRPr lang="en-GB"/>
           </a:p>
@@ -2986,14 +2986,14 @@
           <p:nvPr>
             <p:extLst>
               <p:ext uri="{D42A27DB-BD31-4B8C-83A1-F6EECF244321}">
-                <p14:modId xmlns:p14="http://schemas.microsoft.com/office/powerpoint/2010/main" val="3226043311"/>
+                <p14:modId xmlns:p14="http://schemas.microsoft.com/office/powerpoint/2010/main" val="1562586740"/>
               </p:ext>
             </p:extLst>
           </p:nvPr>
         </p:nvGraphicFramePr>
         <p:xfrm>
-          <a:off x="2997233" y="6670546"/>
-          <a:ext cx="1838752" cy="1544285"/>
+          <a:off x="5953793" y="6670546"/>
+          <a:ext cx="1838752" cy="1936485"/>
         </p:xfrm>
         <a:graphic>
           <a:graphicData uri="http://schemas.openxmlformats.org/drawingml/2006/table">
@@ -3018,7 +3018,7 @@
                     <a:p>
                       <a:r>
                         <a:rPr lang="en-GB" sz="1400" dirty="0"/>
-                        <a:t>input.py</a:t>
+                        <a:t>Food_from_menu.py</a:t>
                       </a:r>
                     </a:p>
                   </a:txBody>
@@ -3073,6 +3073,12 @@
                       </a:r>
                       <a:endParaRPr lang="en-GB" sz="1400" dirty="0"/>
                     </a:p>
+                    <a:p>
+                      <a:r>
+                        <a:rPr lang="en-GB" sz="1400" dirty="0"/>
+                        <a:t>+menu</a:t>
+                      </a:r>
+                    </a:p>
                   </a:txBody>
                   <a:tcPr marL="73150" marR="73150" marT="36575" marB="36575"/>
                 </a:tc>
@@ -3087,6 +3093,44 @@
                   <a:txBody>
                     <a:bodyPr/>
                     <a:lstStyle/>
+                    <a:p>
+                      <a:r>
+                        <a:rPr lang="en-GB" sz="1400" kern="1200" dirty="0">
+                          <a:solidFill>
+                            <a:schemeClr val="tx1"/>
+                          </a:solidFill>
+                          <a:effectLst/>
+                          <a:latin typeface="+mn-lt"/>
+                          <a:ea typeface="+mn-ea"/>
+                          <a:cs typeface="+mn-cs"/>
+                        </a:rPr>
+                        <a:t>+</a:t>
+                      </a:r>
+                      <a:r>
+                        <a:rPr lang="en-GB" sz="1400" kern="1200" dirty="0" err="1">
+                          <a:solidFill>
+                            <a:schemeClr val="tx1"/>
+                          </a:solidFill>
+                          <a:effectLst/>
+                          <a:latin typeface="+mn-lt"/>
+                          <a:ea typeface="+mn-ea"/>
+                          <a:cs typeface="+mn-cs"/>
+                        </a:rPr>
+                        <a:t>input_menu</a:t>
+                      </a:r>
+                      <a:r>
+                        <a:rPr lang="en-GB" sz="1400" kern="1200" dirty="0">
+                          <a:solidFill>
+                            <a:schemeClr val="tx1"/>
+                          </a:solidFill>
+                          <a:effectLst/>
+                          <a:latin typeface="+mn-lt"/>
+                          <a:ea typeface="+mn-ea"/>
+                          <a:cs typeface="+mn-cs"/>
+                        </a:rPr>
+                        <a:t>()</a:t>
+                      </a:r>
+                    </a:p>
                     <a:p>
                       <a:r>
                         <a:rPr lang="en-GB" sz="1400" kern="1200" dirty="0">
@@ -3154,13 +3198,13 @@
           <p:nvPr>
             <p:extLst>
               <p:ext uri="{D42A27DB-BD31-4B8C-83A1-F6EECF244321}">
-                <p14:modId xmlns:p14="http://schemas.microsoft.com/office/powerpoint/2010/main" val="867993999"/>
+                <p14:modId xmlns:p14="http://schemas.microsoft.com/office/powerpoint/2010/main" val="1769432216"/>
               </p:ext>
             </p:extLst>
           </p:nvPr>
         </p:nvGraphicFramePr>
         <p:xfrm>
-          <a:off x="10407697" y="6585723"/>
+          <a:off x="13364257" y="6585723"/>
           <a:ext cx="2856355" cy="2856929"/>
         </p:xfrm>
         <a:graphic>
@@ -3421,13 +3465,13 @@
           <p:nvPr>
             <p:extLst>
               <p:ext uri="{D42A27DB-BD31-4B8C-83A1-F6EECF244321}">
-                <p14:modId xmlns:p14="http://schemas.microsoft.com/office/powerpoint/2010/main" val="4159324689"/>
+                <p14:modId xmlns:p14="http://schemas.microsoft.com/office/powerpoint/2010/main" val="3430503742"/>
               </p:ext>
             </p:extLst>
           </p:nvPr>
         </p:nvGraphicFramePr>
         <p:xfrm>
-          <a:off x="6423462" y="6461603"/>
+          <a:off x="9380022" y="6461603"/>
           <a:ext cx="2590062" cy="1939373"/>
         </p:xfrm>
         <a:graphic>
@@ -3597,7 +3641,7 @@
         </p:nvSpPr>
         <p:spPr>
           <a:xfrm>
-            <a:off x="4783471" y="6889596"/>
+            <a:off x="7740031" y="6889596"/>
             <a:ext cx="667337" cy="231001"/>
           </a:xfrm>
           <a:prstGeom prst="diamond">
@@ -3654,7 +3698,7 @@
         </p:nvCxnSpPr>
         <p:spPr>
           <a:xfrm flipH="1">
-            <a:off x="5450807" y="6961210"/>
+            <a:off x="8407367" y="6961210"/>
             <a:ext cx="972654" cy="43889"/>
           </a:xfrm>
           <a:prstGeom prst="line">
@@ -3700,13 +3744,13 @@
           <p:nvPr>
             <p:extLst>
               <p:ext uri="{D42A27DB-BD31-4B8C-83A1-F6EECF244321}">
-                <p14:modId xmlns:p14="http://schemas.microsoft.com/office/powerpoint/2010/main" val="1280176280"/>
+                <p14:modId xmlns:p14="http://schemas.microsoft.com/office/powerpoint/2010/main" val="3566482779"/>
               </p:ext>
             </p:extLst>
           </p:nvPr>
         </p:nvGraphicFramePr>
         <p:xfrm>
-          <a:off x="3027320" y="5383364"/>
+          <a:off x="5983880" y="5383364"/>
           <a:ext cx="1598734" cy="292602"/>
         </p:xfrm>
         <a:graphic>
@@ -3762,7 +3806,7 @@
         </p:nvSpPr>
         <p:spPr>
           <a:xfrm>
-            <a:off x="3595959" y="6430234"/>
+            <a:off x="6552519" y="6430234"/>
             <a:ext cx="667337" cy="231001"/>
           </a:xfrm>
           <a:prstGeom prst="diamond">
@@ -3818,7 +3862,7 @@
         </p:nvCxnSpPr>
         <p:spPr>
           <a:xfrm flipV="1">
-            <a:off x="3929627" y="5668518"/>
+            <a:off x="6886187" y="5668518"/>
             <a:ext cx="0" cy="752404"/>
           </a:xfrm>
           <a:prstGeom prst="line">
@@ -3860,13 +3904,13 @@
           <p:nvPr>
             <p:extLst>
               <p:ext uri="{D42A27DB-BD31-4B8C-83A1-F6EECF244321}">
-                <p14:modId xmlns:p14="http://schemas.microsoft.com/office/powerpoint/2010/main" val="4215931729"/>
+                <p14:modId xmlns:p14="http://schemas.microsoft.com/office/powerpoint/2010/main" val="3747166750"/>
               </p:ext>
             </p:extLst>
           </p:nvPr>
         </p:nvGraphicFramePr>
         <p:xfrm>
-          <a:off x="10121957" y="4869175"/>
+          <a:off x="13078517" y="4869175"/>
           <a:ext cx="2002238" cy="1106072"/>
         </p:xfrm>
         <a:graphic>
@@ -3979,7 +4023,7 @@
         </p:nvSpPr>
         <p:spPr>
           <a:xfrm>
-            <a:off x="9002266" y="6880356"/>
+            <a:off x="11958826" y="6880356"/>
             <a:ext cx="667337" cy="231001"/>
           </a:xfrm>
           <a:prstGeom prst="diamond">
@@ -4035,7 +4079,7 @@
         </p:nvCxnSpPr>
         <p:spPr>
           <a:xfrm flipH="1" flipV="1">
-            <a:off x="9664847" y="6994382"/>
+            <a:off x="12621407" y="6994382"/>
             <a:ext cx="746713" cy="1475"/>
           </a:xfrm>
           <a:prstGeom prst="line">
@@ -4080,7 +4124,7 @@
         </p:nvSpPr>
         <p:spPr>
           <a:xfrm>
-            <a:off x="11605100" y="4609602"/>
+            <a:off x="14561660" y="4609602"/>
             <a:ext cx="667337" cy="231001"/>
           </a:xfrm>
           <a:prstGeom prst="diamond">
@@ -4136,7 +4180,7 @@
         </p:nvCxnSpPr>
         <p:spPr>
           <a:xfrm flipV="1">
-            <a:off x="11934832" y="3719361"/>
+            <a:off x="14891392" y="3719361"/>
             <a:ext cx="69926" cy="917753"/>
           </a:xfrm>
           <a:prstGeom prst="line">
@@ -4182,13 +4226,13 @@
           <p:nvPr>
             <p:extLst>
               <p:ext uri="{D42A27DB-BD31-4B8C-83A1-F6EECF244321}">
-                <p14:modId xmlns:p14="http://schemas.microsoft.com/office/powerpoint/2010/main" val="3189292284"/>
+                <p14:modId xmlns:p14="http://schemas.microsoft.com/office/powerpoint/2010/main" val="1528991130"/>
               </p:ext>
             </p:extLst>
           </p:nvPr>
         </p:nvGraphicFramePr>
         <p:xfrm>
-          <a:off x="8352542" y="2525469"/>
+          <a:off x="11309102" y="2525469"/>
           <a:ext cx="2524037" cy="1316708"/>
         </p:xfrm>
         <a:graphic>
@@ -4328,7 +4372,7 @@
         </p:nvSpPr>
         <p:spPr>
           <a:xfrm>
-            <a:off x="10799762" y="6333496"/>
+            <a:off x="13756322" y="6333496"/>
             <a:ext cx="667337" cy="231001"/>
           </a:xfrm>
           <a:prstGeom prst="diamond">
@@ -4386,7 +4430,7 @@
         </p:nvCxnSpPr>
         <p:spPr>
           <a:xfrm flipH="1" flipV="1">
-            <a:off x="11123075" y="5975247"/>
+            <a:off x="14079635" y="5975247"/>
             <a:ext cx="10356" cy="358249"/>
           </a:xfrm>
           <a:prstGeom prst="line">
@@ -4432,13 +4476,13 @@
           <p:nvPr>
             <p:extLst>
               <p:ext uri="{D42A27DB-BD31-4B8C-83A1-F6EECF244321}">
-                <p14:modId xmlns:p14="http://schemas.microsoft.com/office/powerpoint/2010/main" val="2001245321"/>
+                <p14:modId xmlns:p14="http://schemas.microsoft.com/office/powerpoint/2010/main" val="938106041"/>
               </p:ext>
             </p:extLst>
           </p:nvPr>
         </p:nvGraphicFramePr>
         <p:xfrm>
-          <a:off x="15122942" y="6964429"/>
+          <a:off x="18079502" y="6964429"/>
           <a:ext cx="1893790" cy="1105383"/>
         </p:xfrm>
         <a:graphic>
@@ -4564,7 +4608,7 @@
         </p:nvSpPr>
         <p:spPr>
           <a:xfrm>
-            <a:off x="13264054" y="6807363"/>
+            <a:off x="16220614" y="6807363"/>
             <a:ext cx="667337" cy="231001"/>
           </a:xfrm>
           <a:prstGeom prst="diamond">
@@ -4622,7 +4666,7 @@
         </p:nvCxnSpPr>
         <p:spPr>
           <a:xfrm flipH="1" flipV="1">
-            <a:off x="13931391" y="6922864"/>
+            <a:off x="16887951" y="6922864"/>
             <a:ext cx="1191551" cy="594256"/>
           </a:xfrm>
           <a:prstGeom prst="line">
@@ -4668,13 +4712,13 @@
           <p:nvPr>
             <p:extLst>
               <p:ext uri="{D42A27DB-BD31-4B8C-83A1-F6EECF244321}">
-                <p14:modId xmlns:p14="http://schemas.microsoft.com/office/powerpoint/2010/main" val="2280634587"/>
+                <p14:modId xmlns:p14="http://schemas.microsoft.com/office/powerpoint/2010/main" val="3121615054"/>
               </p:ext>
             </p:extLst>
           </p:nvPr>
         </p:nvGraphicFramePr>
         <p:xfrm>
-          <a:off x="15183102" y="8965111"/>
+          <a:off x="18139662" y="8965111"/>
           <a:ext cx="1598734" cy="296665"/>
         </p:xfrm>
         <a:graphic>
@@ -4730,7 +4774,7 @@
         </p:nvSpPr>
         <p:spPr>
           <a:xfrm>
-            <a:off x="15648801" y="8693136"/>
+            <a:off x="18605361" y="8693136"/>
             <a:ext cx="667337" cy="231001"/>
           </a:xfrm>
           <a:prstGeom prst="diamond">
@@ -4786,7 +4830,7 @@
         </p:nvCxnSpPr>
         <p:spPr>
           <a:xfrm flipV="1">
-            <a:off x="15982469" y="8069812"/>
+            <a:off x="18939029" y="8069812"/>
             <a:ext cx="0" cy="623324"/>
           </a:xfrm>
           <a:prstGeom prst="line">
@@ -4832,13 +4876,13 @@
           <p:nvPr>
             <p:extLst>
               <p:ext uri="{D42A27DB-BD31-4B8C-83A1-F6EECF244321}">
-                <p14:modId xmlns:p14="http://schemas.microsoft.com/office/powerpoint/2010/main" val="2702365496"/>
+                <p14:modId xmlns:p14="http://schemas.microsoft.com/office/powerpoint/2010/main" val="1378743944"/>
               </p:ext>
             </p:extLst>
           </p:nvPr>
         </p:nvGraphicFramePr>
         <p:xfrm>
-          <a:off x="11512386" y="3115808"/>
+          <a:off x="14468946" y="3115808"/>
           <a:ext cx="2284508" cy="589267"/>
         </p:xfrm>
         <a:graphic>
@@ -4922,7 +4966,7 @@
         </p:nvSpPr>
         <p:spPr>
           <a:xfrm>
-            <a:off x="10038204" y="4633280"/>
+            <a:off x="12994764" y="4633280"/>
             <a:ext cx="667337" cy="231001"/>
           </a:xfrm>
           <a:prstGeom prst="diamond">
@@ -4978,7 +5022,7 @@
         </p:nvCxnSpPr>
         <p:spPr>
           <a:xfrm flipV="1">
-            <a:off x="10305882" y="3847071"/>
+            <a:off x="13262442" y="3847071"/>
             <a:ext cx="0" cy="851243"/>
           </a:xfrm>
           <a:prstGeom prst="line">
@@ -5023,7 +5067,7 @@
         </p:nvSpPr>
         <p:spPr>
           <a:xfrm>
-            <a:off x="9454620" y="5445667"/>
+            <a:off x="12411180" y="5445667"/>
             <a:ext cx="667337" cy="231001"/>
           </a:xfrm>
           <a:prstGeom prst="diamond">
@@ -5080,7 +5124,7 @@
         </p:nvCxnSpPr>
         <p:spPr>
           <a:xfrm flipH="1" flipV="1">
-            <a:off x="8634502" y="5091789"/>
+            <a:off x="11591062" y="5091789"/>
             <a:ext cx="820118" cy="469379"/>
           </a:xfrm>
           <a:prstGeom prst="line">
@@ -5126,13 +5170,13 @@
           <p:nvPr>
             <p:extLst>
               <p:ext uri="{D42A27DB-BD31-4B8C-83A1-F6EECF244321}">
-                <p14:modId xmlns:p14="http://schemas.microsoft.com/office/powerpoint/2010/main" val="93266780"/>
+                <p14:modId xmlns:p14="http://schemas.microsoft.com/office/powerpoint/2010/main" val="3774216711"/>
               </p:ext>
             </p:extLst>
           </p:nvPr>
         </p:nvGraphicFramePr>
         <p:xfrm>
-          <a:off x="6349994" y="4622724"/>
+          <a:off x="9306554" y="4622724"/>
           <a:ext cx="2284508" cy="589267"/>
         </p:xfrm>
         <a:graphic>
@@ -5217,7 +5261,7 @@
         </p:nvSpPr>
         <p:spPr>
           <a:xfrm>
-            <a:off x="7572472" y="6188682"/>
+            <a:off x="10529032" y="6188682"/>
             <a:ext cx="667337" cy="231001"/>
           </a:xfrm>
           <a:prstGeom prst="diamond">
@@ -5274,7 +5318,7 @@
         </p:nvCxnSpPr>
         <p:spPr>
           <a:xfrm flipV="1">
-            <a:off x="7906141" y="5211991"/>
+            <a:off x="10862701" y="5211991"/>
             <a:ext cx="0" cy="976691"/>
           </a:xfrm>
           <a:prstGeom prst="line">
@@ -5319,7 +5363,7 @@
         </p:nvSpPr>
         <p:spPr>
           <a:xfrm>
-            <a:off x="4489077" y="6430234"/>
+            <a:off x="7445637" y="6430234"/>
             <a:ext cx="667337" cy="231001"/>
           </a:xfrm>
           <a:prstGeom prst="diamond">
@@ -5377,7 +5421,7 @@
         </p:nvCxnSpPr>
         <p:spPr>
           <a:xfrm flipV="1">
-            <a:off x="4822746" y="4917357"/>
+            <a:off x="7779306" y="4917357"/>
             <a:ext cx="1527248" cy="1512877"/>
           </a:xfrm>
           <a:prstGeom prst="line">
@@ -5402,6 +5446,166 @@
           </a:fillRef>
           <a:effectRef idx="0">
             <a:scrgbClr r="0" g="0" b="0"/>
+          </a:effectRef>
+          <a:fontRef idx="minor">
+            <a:schemeClr val="tx1"/>
+          </a:fontRef>
+        </p:style>
+      </p:cxnSp>
+      <p:graphicFrame>
+        <p:nvGraphicFramePr>
+          <p:cNvPr id="42" name="Table 5">
+            <a:extLst>
+              <a:ext uri="{FF2B5EF4-FFF2-40B4-BE49-F238E27FC236}">
+                <a16:creationId xmlns:a16="http://schemas.microsoft.com/office/drawing/2014/main" id="{D8FBEF08-23AA-47D8-A38B-1034DB0D5645}"/>
+              </a:ext>
+            </a:extLst>
+          </p:cNvPr>
+          <p:cNvGraphicFramePr>
+            <a:graphicFrameLocks noGrp="1"/>
+          </p:cNvGraphicFramePr>
+          <p:nvPr>
+            <p:extLst>
+              <p:ext uri="{D42A27DB-BD31-4B8C-83A1-F6EECF244321}">
+                <p14:modId xmlns:p14="http://schemas.microsoft.com/office/powerpoint/2010/main" val="3340991854"/>
+              </p:ext>
+            </p:extLst>
+          </p:nvPr>
+        </p:nvGraphicFramePr>
+        <p:xfrm>
+          <a:off x="3268981" y="5828946"/>
+          <a:ext cx="1598734" cy="292602"/>
+        </p:xfrm>
+        <a:graphic>
+          <a:graphicData uri="http://schemas.openxmlformats.org/drawingml/2006/table">
+            <a:tbl>
+              <a:tblPr firstRow="1" bandRow="1">
+                <a:tableStyleId>{5940675A-B579-460E-94D1-54222C63F5DA}</a:tableStyleId>
+              </a:tblPr>
+              <a:tblGrid>
+                <a:gridCol w="1598734">
+                  <a:extLst>
+                    <a:ext uri="{9D8B030D-6E8A-4147-A177-3AD203B41FA5}">
+                      <a16:colId xmlns:a16="http://schemas.microsoft.com/office/drawing/2014/main" val="306141693"/>
+                    </a:ext>
+                  </a:extLst>
+                </a:gridCol>
+              </a:tblGrid>
+              <a:tr h="292602">
+                <a:tc>
+                  <a:txBody>
+                    <a:bodyPr/>
+                    <a:lstStyle/>
+                    <a:p>
+                      <a:r>
+                        <a:rPr lang="en-GB" sz="1400" dirty="0"/>
+                        <a:t>Main.py</a:t>
+                      </a:r>
+                    </a:p>
+                  </a:txBody>
+                  <a:tcPr marL="73150" marR="73150" marT="36575" marB="36575"/>
+                </a:tc>
+                <a:extLst>
+                  <a:ext uri="{0D108BD9-81ED-4DB2-BD59-A6C34878D82A}">
+                    <a16:rowId xmlns:a16="http://schemas.microsoft.com/office/drawing/2014/main" val="3500643278"/>
+                  </a:ext>
+                </a:extLst>
+              </a:tr>
+            </a:tbl>
+          </a:graphicData>
+        </a:graphic>
+      </p:graphicFrame>
+      <p:sp>
+        <p:nvSpPr>
+          <p:cNvPr id="43" name="Diamond 42">
+            <a:extLst>
+              <a:ext uri="{FF2B5EF4-FFF2-40B4-BE49-F238E27FC236}">
+                <a16:creationId xmlns:a16="http://schemas.microsoft.com/office/drawing/2014/main" id="{7E8FE298-02B9-430C-B3D4-BEDD38B0AD1E}"/>
+              </a:ext>
+            </a:extLst>
+          </p:cNvPr>
+          <p:cNvSpPr/>
+          <p:nvPr/>
+        </p:nvSpPr>
+        <p:spPr>
+          <a:xfrm>
+            <a:off x="4875945" y="5865761"/>
+            <a:ext cx="667337" cy="231001"/>
+          </a:xfrm>
+          <a:prstGeom prst="diamond">
+            <a:avLst/>
+          </a:prstGeom>
+          <a:solidFill>
+            <a:schemeClr val="tx1"/>
+          </a:solidFill>
+          <a:ln>
+            <a:solidFill>
+              <a:schemeClr val="tx1"/>
+            </a:solidFill>
+          </a:ln>
+        </p:spPr>
+        <p:style>
+          <a:lnRef idx="2">
+            <a:schemeClr val="accent1">
+              <a:shade val="50000"/>
+            </a:schemeClr>
+          </a:lnRef>
+          <a:fillRef idx="1">
+            <a:schemeClr val="accent1"/>
+          </a:fillRef>
+          <a:effectRef idx="0">
+            <a:schemeClr val="accent1"/>
+          </a:effectRef>
+          <a:fontRef idx="minor">
+            <a:schemeClr val="lt1"/>
+          </a:fontRef>
+        </p:style>
+        <p:txBody>
+          <a:bodyPr rtlCol="0" anchor="ctr"/>
+          <a:lstStyle/>
+          <a:p>
+            <a:pPr algn="ctr"/>
+            <a:endParaRPr lang="en-GB" sz="1440"/>
+          </a:p>
+        </p:txBody>
+      </p:sp>
+      <p:cxnSp>
+        <p:nvCxnSpPr>
+          <p:cNvPr id="44" name="Straight Connector 43">
+            <a:extLst>
+              <a:ext uri="{FF2B5EF4-FFF2-40B4-BE49-F238E27FC236}">
+                <a16:creationId xmlns:a16="http://schemas.microsoft.com/office/drawing/2014/main" id="{9E79CF61-34A6-43E1-A09A-63CEF333F5FC}"/>
+              </a:ext>
+            </a:extLst>
+          </p:cNvPr>
+          <p:cNvCxnSpPr>
+            <a:cxnSpLocks/>
+          </p:cNvCxnSpPr>
+          <p:nvPr/>
+        </p:nvCxnSpPr>
+        <p:spPr>
+          <a:xfrm flipH="1" flipV="1">
+            <a:off x="5543282" y="5975248"/>
+            <a:ext cx="410509" cy="947615"/>
+          </a:xfrm>
+          <a:prstGeom prst="line">
+            <a:avLst/>
+          </a:prstGeom>
+          <a:ln>
+            <a:solidFill>
+              <a:schemeClr val="tx1"/>
+            </a:solidFill>
+          </a:ln>
+        </p:spPr>
+        <p:style>
+          <a:lnRef idx="1">
+            <a:schemeClr val="accent1"/>
+          </a:lnRef>
+          <a:fillRef idx="0">
+            <a:schemeClr val="accent1"/>
+          </a:fillRef>
+          <a:effectRef idx="0">
+            <a:schemeClr val="accent1"/>
           </a:effectRef>
           <a:fontRef idx="minor">
             <a:schemeClr val="tx1"/>

</xml_diff>